<commit_message>
set() description and example
</commit_message>
<xml_diff>
--- a/5_presentations/NestedForLoops.pptx
+++ b/5_presentations/NestedForLoops.pptx
@@ -6,7 +6,7 @@
     <p:sldMasterId id="2147483661" r:id="rId2"/>
   </p:sldMasterIdLst>
   <p:notesMasterIdLst>
-    <p:notesMasterId r:id="rId18"/>
+    <p:notesMasterId r:id="rId19"/>
   </p:notesMasterIdLst>
   <p:sldIdLst>
     <p:sldId id="256" r:id="rId3"/>
@@ -23,7 +23,8 @@
     <p:sldId id="1631" r:id="rId14"/>
     <p:sldId id="1632" r:id="rId15"/>
     <p:sldId id="1634" r:id="rId16"/>
-    <p:sldId id="1622" r:id="rId17"/>
+    <p:sldId id="1635" r:id="rId17"/>
+    <p:sldId id="1622" r:id="rId18"/>
   </p:sldIdLst>
   <p:sldSz cx="12192000" cy="6858000"/>
   <p:notesSz cx="6858000" cy="9144000"/>
@@ -212,7 +213,7 @@
           <a:p>
             <a:fld id="{354D3AFA-F451-444D-BAEC-38D955773079}" type="datetimeFigureOut">
               <a:rPr lang="en-US" smtClean="0"/>
-              <a:t>3/17/2020</a:t>
+              <a:t>3/18/2020</a:t>
             </a:fld>
             <a:endParaRPr lang="en-US"/>
           </a:p>
@@ -722,7 +723,7 @@
                 <a:tabLst/>
                 <a:defRPr/>
               </a:pPr>
-              <a:t>3/17/2020 12:45 PM</a:t>
+              <a:t>3/18/2020 7:46 AM</a:t>
             </a:fld>
             <a:endParaRPr kumimoji="0" lang="en-US" sz="1200" b="0" i="0" u="none" strike="noStrike" kern="1200" cap="none" spc="0" normalizeH="0" baseline="0" noProof="0" dirty="0">
               <a:ln>
@@ -1080,7 +1081,7 @@
                 <a:tabLst/>
                 <a:defRPr/>
               </a:pPr>
-              <a:t>3/17/2020 1:53 PM</a:t>
+              <a:t>3/18/2020 7:46 AM</a:t>
             </a:fld>
             <a:endParaRPr kumimoji="0" lang="en-US" sz="1200" b="0" i="0" u="none" strike="noStrike" kern="1200" cap="none" spc="0" normalizeH="0" baseline="0" noProof="0" dirty="0">
               <a:ln>
@@ -1438,7 +1439,7 @@
                 <a:tabLst/>
                 <a:defRPr/>
               </a:pPr>
-              <a:t>3/17/2020 2:07 PM</a:t>
+              <a:t>3/18/2020 7:46 AM</a:t>
             </a:fld>
             <a:endParaRPr kumimoji="0" lang="en-US" sz="1200" b="0" i="0" u="none" strike="noStrike" kern="1200" cap="none" spc="0" normalizeH="0" baseline="0" noProof="0" dirty="0">
               <a:ln>
@@ -1796,7 +1797,7 @@
                 <a:tabLst/>
                 <a:defRPr/>
               </a:pPr>
-              <a:t>3/17/2020 2:28 PM</a:t>
+              <a:t>3/18/2020 7:46 AM</a:t>
             </a:fld>
             <a:endParaRPr kumimoji="0" lang="en-US" sz="1200" b="0" i="0" u="none" strike="noStrike" kern="1200" cap="none" spc="0" normalizeH="0" baseline="0" noProof="0" dirty="0">
               <a:ln>
@@ -2154,7 +2155,7 @@
                 <a:tabLst/>
                 <a:defRPr/>
               </a:pPr>
-              <a:t>3/17/2020 2:25 PM</a:t>
+              <a:t>3/18/2020 7:46 AM</a:t>
             </a:fld>
             <a:endParaRPr kumimoji="0" lang="en-US" sz="1200" b="0" i="0" u="none" strike="noStrike" kern="1200" cap="none" spc="0" normalizeH="0" baseline="0" noProof="0" dirty="0">
               <a:ln>
@@ -2296,6 +2297,364 @@
             <p:ph type="sldImg"/>
           </p:nvPr>
         </p:nvSpPr>
+        <p:spPr/>
+      </p:sp>
+      <p:sp>
+        <p:nvSpPr>
+          <p:cNvPr id="3" name="Notes Placeholder 2"/>
+          <p:cNvSpPr>
+            <a:spLocks noGrp="1"/>
+          </p:cNvSpPr>
+          <p:nvPr>
+            <p:ph type="body" idx="1"/>
+          </p:nvPr>
+        </p:nvSpPr>
+        <p:spPr/>
+        <p:txBody>
+          <a:bodyPr/>
+          <a:lstStyle/>
+          <a:p>
+            <a:endParaRPr lang="en-US" dirty="0"/>
+          </a:p>
+        </p:txBody>
+      </p:sp>
+      <p:sp>
+        <p:nvSpPr>
+          <p:cNvPr id="4" name="Header Placeholder 3"/>
+          <p:cNvSpPr>
+            <a:spLocks noGrp="1"/>
+          </p:cNvSpPr>
+          <p:nvPr>
+            <p:ph type="hdr" sz="quarter" idx="10"/>
+          </p:nvPr>
+        </p:nvSpPr>
+        <p:spPr/>
+        <p:txBody>
+          <a:bodyPr/>
+          <a:lstStyle/>
+          <a:p>
+            <a:pPr marL="0" marR="0" lvl="0" indent="0" algn="l" defTabSz="932742" rtl="0" eaLnBrk="1" fontAlgn="auto" latinLnBrk="0" hangingPunct="1">
+              <a:lnSpc>
+                <a:spcPct val="100000"/>
+              </a:lnSpc>
+              <a:spcBef>
+                <a:spcPts val="0"/>
+              </a:spcBef>
+              <a:spcAft>
+                <a:spcPts val="0"/>
+              </a:spcAft>
+              <a:buClrTx/>
+              <a:buSzTx/>
+              <a:buFontTx/>
+              <a:buNone/>
+              <a:tabLst/>
+              <a:defRPr/>
+            </a:pPr>
+            <a:endParaRPr kumimoji="0" lang="en-US" sz="1200" b="0" i="0" u="none" strike="noStrike" kern="1200" cap="none" spc="0" normalizeH="0" baseline="0" noProof="0" dirty="0">
+              <a:ln>
+                <a:noFill/>
+              </a:ln>
+              <a:solidFill>
+                <a:prstClr val="black"/>
+              </a:solidFill>
+              <a:effectLst/>
+              <a:uLnTx/>
+              <a:uFillTx/>
+              <a:latin typeface="Segoe UI" pitchFamily="34" charset="0"/>
+              <a:ea typeface="+mn-ea"/>
+              <a:cs typeface="+mn-cs"/>
+            </a:endParaRPr>
+          </a:p>
+        </p:txBody>
+      </p:sp>
+      <p:sp>
+        <p:nvSpPr>
+          <p:cNvPr id="5" name="Footer Placeholder 4"/>
+          <p:cNvSpPr>
+            <a:spLocks noGrp="1"/>
+          </p:cNvSpPr>
+          <p:nvPr>
+            <p:ph type="ftr" sz="quarter" idx="11"/>
+          </p:nvPr>
+        </p:nvSpPr>
+        <p:spPr/>
+        <p:txBody>
+          <a:bodyPr/>
+          <a:lstStyle/>
+          <a:p>
+            <a:pPr marL="571500" marR="0" lvl="0" indent="0" algn="l" defTabSz="914099" rtl="0" eaLnBrk="0" fontAlgn="auto" latinLnBrk="0" hangingPunct="0">
+              <a:lnSpc>
+                <a:spcPct val="100000"/>
+              </a:lnSpc>
+              <a:spcBef>
+                <a:spcPts val="0"/>
+              </a:spcBef>
+              <a:spcAft>
+                <a:spcPts val="0"/>
+              </a:spcAft>
+              <a:buClrTx/>
+              <a:buSzTx/>
+              <a:buFontTx/>
+              <a:buNone/>
+              <a:tabLst/>
+              <a:defRPr/>
+            </a:pPr>
+            <a:r>
+              <a:rPr kumimoji="0" lang="en-US" sz="400" b="0" i="0" u="none" strike="noStrike" kern="1200" cap="none" spc="0" normalizeH="0" baseline="0" noProof="0">
+                <a:ln>
+                  <a:noFill/>
+                </a:ln>
+                <a:gradFill>
+                  <a:gsLst>
+                    <a:gs pos="0">
+                      <a:prstClr val="black"/>
+                    </a:gs>
+                    <a:gs pos="100000">
+                      <a:prstClr val="black"/>
+                    </a:gs>
+                  </a:gsLst>
+                  <a:lin ang="5400000" scaled="0"/>
+                </a:gradFill>
+                <a:effectLst/>
+                <a:uLnTx/>
+                <a:uFillTx/>
+                <a:latin typeface="Segoe UI" pitchFamily="34" charset="0"/>
+                <a:ea typeface="Segoe UI" pitchFamily="34" charset="0"/>
+                <a:cs typeface="Segoe UI" pitchFamily="34" charset="0"/>
+              </a:rPr>
+              <a:t>© Microsoft Corporation. All rights reserved. MICROSOFT MAKES NO WARRANTIES, EXPRESS, IMPLIED OR STATUTORY, AS TO THE INFORMATION IN THIS PRESENTATION.</a:t>
+            </a:r>
+            <a:endParaRPr kumimoji="0" lang="en-US" sz="400" b="0" i="0" u="none" strike="noStrike" kern="1200" cap="none" spc="0" normalizeH="0" baseline="0" noProof="0" dirty="0">
+              <a:ln>
+                <a:noFill/>
+              </a:ln>
+              <a:gradFill>
+                <a:gsLst>
+                  <a:gs pos="0">
+                    <a:prstClr val="black"/>
+                  </a:gs>
+                  <a:gs pos="100000">
+                    <a:prstClr val="black"/>
+                  </a:gs>
+                </a:gsLst>
+                <a:lin ang="5400000" scaled="0"/>
+              </a:gradFill>
+              <a:effectLst/>
+              <a:uLnTx/>
+              <a:uFillTx/>
+              <a:latin typeface="Segoe UI" pitchFamily="34" charset="0"/>
+              <a:ea typeface="Segoe UI" pitchFamily="34" charset="0"/>
+              <a:cs typeface="Segoe UI" pitchFamily="34" charset="0"/>
+            </a:endParaRPr>
+          </a:p>
+        </p:txBody>
+      </p:sp>
+      <p:sp>
+        <p:nvSpPr>
+          <p:cNvPr id="6" name="Date Placeholder 5"/>
+          <p:cNvSpPr>
+            <a:spLocks noGrp="1"/>
+          </p:cNvSpPr>
+          <p:nvPr>
+            <p:ph type="dt" idx="12"/>
+          </p:nvPr>
+        </p:nvSpPr>
+        <p:spPr/>
+        <p:txBody>
+          <a:bodyPr/>
+          <a:lstStyle/>
+          <a:p>
+            <a:pPr marL="0" marR="0" lvl="0" indent="0" algn="r" defTabSz="932742" rtl="0" eaLnBrk="1" fontAlgn="auto" latinLnBrk="0" hangingPunct="1">
+              <a:lnSpc>
+                <a:spcPct val="100000"/>
+              </a:lnSpc>
+              <a:spcBef>
+                <a:spcPts val="0"/>
+              </a:spcBef>
+              <a:spcAft>
+                <a:spcPts val="0"/>
+              </a:spcAft>
+              <a:buClrTx/>
+              <a:buSzTx/>
+              <a:buFontTx/>
+              <a:buNone/>
+              <a:tabLst/>
+              <a:defRPr/>
+            </a:pPr>
+            <a:fld id="{35A2D088-BDBD-41A5-ADCE-5C6A4DC08057}" type="datetime8">
+              <a:rPr kumimoji="0" lang="en-US" sz="1200" b="0" i="0" u="none" strike="noStrike" kern="1200" cap="none" spc="0" normalizeH="0" baseline="0" noProof="0" smtClean="0">
+                <a:ln>
+                  <a:noFill/>
+                </a:ln>
+                <a:solidFill>
+                  <a:prstClr val="black"/>
+                </a:solidFill>
+                <a:effectLst/>
+                <a:uLnTx/>
+                <a:uFillTx/>
+                <a:latin typeface="Segoe UI" pitchFamily="34" charset="0"/>
+                <a:ea typeface="+mn-ea"/>
+                <a:cs typeface="+mn-cs"/>
+              </a:rPr>
+              <a:pPr marL="0" marR="0" lvl="0" indent="0" algn="r" defTabSz="932742" rtl="0" eaLnBrk="1" fontAlgn="auto" latinLnBrk="0" hangingPunct="1">
+                <a:lnSpc>
+                  <a:spcPct val="100000"/>
+                </a:lnSpc>
+                <a:spcBef>
+                  <a:spcPts val="0"/>
+                </a:spcBef>
+                <a:spcAft>
+                  <a:spcPts val="0"/>
+                </a:spcAft>
+                <a:buClrTx/>
+                <a:buSzTx/>
+                <a:buFontTx/>
+                <a:buNone/>
+                <a:tabLst/>
+                <a:defRPr/>
+              </a:pPr>
+              <a:t>3/18/2020 7:52 AM</a:t>
+            </a:fld>
+            <a:endParaRPr kumimoji="0" lang="en-US" sz="1200" b="0" i="0" u="none" strike="noStrike" kern="1200" cap="none" spc="0" normalizeH="0" baseline="0" noProof="0" dirty="0">
+              <a:ln>
+                <a:noFill/>
+              </a:ln>
+              <a:solidFill>
+                <a:prstClr val="black"/>
+              </a:solidFill>
+              <a:effectLst/>
+              <a:uLnTx/>
+              <a:uFillTx/>
+              <a:latin typeface="Segoe UI" pitchFamily="34" charset="0"/>
+              <a:ea typeface="+mn-ea"/>
+              <a:cs typeface="+mn-cs"/>
+            </a:endParaRPr>
+          </a:p>
+        </p:txBody>
+      </p:sp>
+      <p:sp>
+        <p:nvSpPr>
+          <p:cNvPr id="7" name="Slide Number Placeholder 6"/>
+          <p:cNvSpPr>
+            <a:spLocks noGrp="1"/>
+          </p:cNvSpPr>
+          <p:nvPr>
+            <p:ph type="sldNum" sz="quarter" idx="13"/>
+          </p:nvPr>
+        </p:nvSpPr>
+        <p:spPr/>
+        <p:txBody>
+          <a:bodyPr/>
+          <a:lstStyle/>
+          <a:p>
+            <a:pPr marL="0" marR="0" lvl="0" indent="0" algn="r" defTabSz="932742" rtl="0" eaLnBrk="1" fontAlgn="auto" latinLnBrk="0" hangingPunct="1">
+              <a:lnSpc>
+                <a:spcPct val="100000"/>
+              </a:lnSpc>
+              <a:spcBef>
+                <a:spcPts val="0"/>
+              </a:spcBef>
+              <a:spcAft>
+                <a:spcPts val="0"/>
+              </a:spcAft>
+              <a:buClrTx/>
+              <a:buSzTx/>
+              <a:buFontTx/>
+              <a:buNone/>
+              <a:tabLst/>
+              <a:defRPr/>
+            </a:pPr>
+            <a:fld id="{B4008EB6-D09E-4580-8CD6-DDB14511944F}" type="slidenum">
+              <a:rPr kumimoji="0" lang="en-US" sz="1200" b="0" i="0" u="none" strike="noStrike" kern="1200" cap="none" spc="0" normalizeH="0" baseline="0" noProof="0" smtClean="0">
+                <a:ln>
+                  <a:noFill/>
+                </a:ln>
+                <a:solidFill>
+                  <a:prstClr val="black"/>
+                </a:solidFill>
+                <a:effectLst/>
+                <a:uLnTx/>
+                <a:uFillTx/>
+                <a:latin typeface="Segoe UI" pitchFamily="34" charset="0"/>
+                <a:ea typeface="+mn-ea"/>
+                <a:cs typeface="+mn-cs"/>
+              </a:rPr>
+              <a:pPr marL="0" marR="0" lvl="0" indent="0" algn="r" defTabSz="932742" rtl="0" eaLnBrk="1" fontAlgn="auto" latinLnBrk="0" hangingPunct="1">
+                <a:lnSpc>
+                  <a:spcPct val="100000"/>
+                </a:lnSpc>
+                <a:spcBef>
+                  <a:spcPts val="0"/>
+                </a:spcBef>
+                <a:spcAft>
+                  <a:spcPts val="0"/>
+                </a:spcAft>
+                <a:buClrTx/>
+                <a:buSzTx/>
+                <a:buFontTx/>
+                <a:buNone/>
+                <a:tabLst/>
+                <a:defRPr/>
+              </a:pPr>
+              <a:t>15</a:t>
+            </a:fld>
+            <a:endParaRPr kumimoji="0" lang="en-US" sz="1200" b="0" i="0" u="none" strike="noStrike" kern="1200" cap="none" spc="0" normalizeH="0" baseline="0" noProof="0" dirty="0">
+              <a:ln>
+                <a:noFill/>
+              </a:ln>
+              <a:solidFill>
+                <a:prstClr val="black"/>
+              </a:solidFill>
+              <a:effectLst/>
+              <a:uLnTx/>
+              <a:uFillTx/>
+              <a:latin typeface="Segoe UI" pitchFamily="34" charset="0"/>
+              <a:ea typeface="+mn-ea"/>
+              <a:cs typeface="+mn-cs"/>
+            </a:endParaRPr>
+          </a:p>
+        </p:txBody>
+      </p:sp>
+    </p:spTree>
+    <p:extLst>
+      <p:ext uri="{BB962C8B-B14F-4D97-AF65-F5344CB8AC3E}">
+        <p14:creationId xmlns:p14="http://schemas.microsoft.com/office/powerpoint/2010/main" val="1975625718"/>
+      </p:ext>
+    </p:extLst>
+  </p:cSld>
+  <p:clrMapOvr>
+    <a:masterClrMapping/>
+  </p:clrMapOvr>
+</p:notes>
+</file>
+
+<file path=ppt/notesSlides/notesSlide15.xml><?xml version="1.0" encoding="utf-8"?>
+<p:notes xmlns:a="http://schemas.openxmlformats.org/drawingml/2006/main" xmlns:r="http://schemas.openxmlformats.org/officeDocument/2006/relationships" xmlns:p="http://schemas.openxmlformats.org/presentationml/2006/main">
+  <p:cSld>
+    <p:spTree>
+      <p:nvGrpSpPr>
+        <p:cNvPr id="1" name=""/>
+        <p:cNvGrpSpPr/>
+        <p:nvPr/>
+      </p:nvGrpSpPr>
+      <p:grpSpPr>
+        <a:xfrm>
+          <a:off x="0" y="0"/>
+          <a:ext cx="0" cy="0"/>
+          <a:chOff x="0" y="0"/>
+          <a:chExt cx="0" cy="0"/>
+        </a:xfrm>
+      </p:grpSpPr>
+      <p:sp>
+        <p:nvSpPr>
+          <p:cNvPr id="2" name="Slide Image Placeholder 1"/>
+          <p:cNvSpPr>
+            <a:spLocks noGrp="1" noRot="1" noChangeAspect="1"/>
+          </p:cNvSpPr>
+          <p:nvPr>
+            <p:ph type="sldImg"/>
+          </p:nvPr>
+        </p:nvSpPr>
         <p:spPr>
           <a:xfrm>
             <a:off x="381000" y="685800"/>
@@ -2445,7 +2804,7 @@
                 <a:tabLst/>
                 <a:defRPr/>
               </a:pPr>
-              <a:t>3/17/2020 12:39 PM</a:t>
+              <a:t>3/18/2020 7:46 AM</a:t>
             </a:fld>
             <a:endParaRPr kumimoji="0" lang="en-US" sz="1200" b="0" i="0" u="none" strike="noStrike" kern="1200" cap="none" spc="0" normalizeH="0" baseline="0" noProof="0" dirty="0">
               <a:ln>
@@ -2528,7 +2887,7 @@
                 <a:tabLst/>
                 <a:defRPr/>
               </a:pPr>
-              <a:t>15</a:t>
+              <a:t>16</a:t>
             </a:fld>
             <a:endParaRPr kumimoji="0" lang="en-US" sz="1200" b="0" i="0" u="none" strike="noStrike" kern="1200" cap="none" spc="0" normalizeH="0" baseline="0" noProof="0" dirty="0">
               <a:ln>
@@ -2885,7 +3244,7 @@
                 <a:tabLst/>
                 <a:defRPr/>
               </a:pPr>
-              <a:t>3/17/2020 12:49 PM</a:t>
+              <a:t>3/18/2020 7:46 AM</a:t>
             </a:fld>
             <a:endParaRPr kumimoji="0" lang="en-US" sz="1200" b="0" i="0" u="none" strike="noStrike" kern="1200" cap="none" spc="0" normalizeH="0" baseline="0" noProof="0" dirty="0">
               <a:ln>
@@ -3243,7 +3602,7 @@
                 <a:tabLst/>
                 <a:defRPr/>
               </a:pPr>
-              <a:t>3/17/2020 12:39 PM</a:t>
+              <a:t>3/18/2020 7:46 AM</a:t>
             </a:fld>
             <a:endParaRPr kumimoji="0" lang="en-US" sz="1200" b="0" i="0" u="none" strike="noStrike" kern="1200" cap="none" spc="0" normalizeH="0" baseline="0" noProof="0" dirty="0">
               <a:ln>
@@ -3601,7 +3960,7 @@
                 <a:tabLst/>
                 <a:defRPr/>
               </a:pPr>
-              <a:t>3/17/2020 1:23 PM</a:t>
+              <a:t>3/18/2020 7:46 AM</a:t>
             </a:fld>
             <a:endParaRPr kumimoji="0" lang="en-US" sz="1200" b="0" i="0" u="none" strike="noStrike" kern="1200" cap="none" spc="0" normalizeH="0" baseline="0" noProof="0" dirty="0">
               <a:ln>
@@ -3959,7 +4318,7 @@
                 <a:tabLst/>
                 <a:defRPr/>
               </a:pPr>
-              <a:t>3/17/2020 1:27 PM</a:t>
+              <a:t>3/18/2020 7:46 AM</a:t>
             </a:fld>
             <a:endParaRPr kumimoji="0" lang="en-US" sz="1200" b="0" i="0" u="none" strike="noStrike" kern="1200" cap="none" spc="0" normalizeH="0" baseline="0" noProof="0" dirty="0">
               <a:ln>
@@ -4317,7 +4676,7 @@
                 <a:tabLst/>
                 <a:defRPr/>
               </a:pPr>
-              <a:t>3/17/2020 1:32 PM</a:t>
+              <a:t>3/18/2020 7:46 AM</a:t>
             </a:fld>
             <a:endParaRPr kumimoji="0" lang="en-US" sz="1200" b="0" i="0" u="none" strike="noStrike" kern="1200" cap="none" spc="0" normalizeH="0" baseline="0" noProof="0" dirty="0">
               <a:ln>
@@ -4675,7 +5034,7 @@
                 <a:tabLst/>
                 <a:defRPr/>
               </a:pPr>
-              <a:t>3/17/2020 1:38 PM</a:t>
+              <a:t>3/18/2020 7:46 AM</a:t>
             </a:fld>
             <a:endParaRPr kumimoji="0" lang="en-US" sz="1200" b="0" i="0" u="none" strike="noStrike" kern="1200" cap="none" spc="0" normalizeH="0" baseline="0" noProof="0" dirty="0">
               <a:ln>
@@ -5033,7 +5392,7 @@
                 <a:tabLst/>
                 <a:defRPr/>
               </a:pPr>
-              <a:t>3/17/2020 1:46 PM</a:t>
+              <a:t>3/18/2020 7:46 AM</a:t>
             </a:fld>
             <a:endParaRPr kumimoji="0" lang="en-US" sz="1200" b="0" i="0" u="none" strike="noStrike" kern="1200" cap="none" spc="0" normalizeH="0" baseline="0" noProof="0" dirty="0">
               <a:ln>
@@ -5391,7 +5750,7 @@
                 <a:tabLst/>
                 <a:defRPr/>
               </a:pPr>
-              <a:t>3/17/2020 1:49 PM</a:t>
+              <a:t>3/18/2020 7:46 AM</a:t>
             </a:fld>
             <a:endParaRPr kumimoji="0" lang="en-US" sz="1200" b="0" i="0" u="none" strike="noStrike" kern="1200" cap="none" spc="0" normalizeH="0" baseline="0" noProof="0" dirty="0">
               <a:ln>
@@ -5653,7 +6012,7 @@
           <a:p>
             <a:fld id="{DFA8C626-DCFC-44B9-B53F-E89648D7BB7E}" type="datetimeFigureOut">
               <a:rPr lang="en-US" smtClean="0"/>
-              <a:t>3/17/2020</a:t>
+              <a:t>3/18/2020</a:t>
             </a:fld>
             <a:endParaRPr lang="en-US"/>
           </a:p>
@@ -5851,7 +6210,7 @@
           <a:p>
             <a:fld id="{DFA8C626-DCFC-44B9-B53F-E89648D7BB7E}" type="datetimeFigureOut">
               <a:rPr lang="en-US" smtClean="0"/>
-              <a:t>3/17/2020</a:t>
+              <a:t>3/18/2020</a:t>
             </a:fld>
             <a:endParaRPr lang="en-US"/>
           </a:p>
@@ -6059,7 +6418,7 @@
           <a:p>
             <a:fld id="{DFA8C626-DCFC-44B9-B53F-E89648D7BB7E}" type="datetimeFigureOut">
               <a:rPr lang="en-US" smtClean="0"/>
-              <a:t>3/17/2020</a:t>
+              <a:t>3/18/2020</a:t>
             </a:fld>
             <a:endParaRPr lang="en-US"/>
           </a:p>
@@ -8072,7 +8431,7 @@
           <a:p>
             <a:fld id="{DFA8C626-DCFC-44B9-B53F-E89648D7BB7E}" type="datetimeFigureOut">
               <a:rPr lang="en-US" smtClean="0"/>
-              <a:t>3/17/2020</a:t>
+              <a:t>3/18/2020</a:t>
             </a:fld>
             <a:endParaRPr lang="en-US"/>
           </a:p>
@@ -9790,7 +10149,7 @@
           <a:p>
             <a:fld id="{DFA8C626-DCFC-44B9-B53F-E89648D7BB7E}" type="datetimeFigureOut">
               <a:rPr lang="en-US" smtClean="0"/>
-              <a:t>3/17/2020</a:t>
+              <a:t>3/18/2020</a:t>
             </a:fld>
             <a:endParaRPr lang="en-US"/>
           </a:p>
@@ -10055,7 +10414,7 @@
           <a:p>
             <a:fld id="{DFA8C626-DCFC-44B9-B53F-E89648D7BB7E}" type="datetimeFigureOut">
               <a:rPr lang="en-US" smtClean="0"/>
-              <a:t>3/17/2020</a:t>
+              <a:t>3/18/2020</a:t>
             </a:fld>
             <a:endParaRPr lang="en-US"/>
           </a:p>
@@ -10467,7 +10826,7 @@
           <a:p>
             <a:fld id="{DFA8C626-DCFC-44B9-B53F-E89648D7BB7E}" type="datetimeFigureOut">
               <a:rPr lang="en-US" smtClean="0"/>
-              <a:t>3/17/2020</a:t>
+              <a:t>3/18/2020</a:t>
             </a:fld>
             <a:endParaRPr lang="en-US"/>
           </a:p>
@@ -10608,7 +10967,7 @@
           <a:p>
             <a:fld id="{DFA8C626-DCFC-44B9-B53F-E89648D7BB7E}" type="datetimeFigureOut">
               <a:rPr lang="en-US" smtClean="0"/>
-              <a:t>3/17/2020</a:t>
+              <a:t>3/18/2020</a:t>
             </a:fld>
             <a:endParaRPr lang="en-US"/>
           </a:p>
@@ -10721,7 +11080,7 @@
           <a:p>
             <a:fld id="{DFA8C626-DCFC-44B9-B53F-E89648D7BB7E}" type="datetimeFigureOut">
               <a:rPr lang="en-US" smtClean="0"/>
-              <a:t>3/17/2020</a:t>
+              <a:t>3/18/2020</a:t>
             </a:fld>
             <a:endParaRPr lang="en-US"/>
           </a:p>
@@ -11032,7 +11391,7 @@
           <a:p>
             <a:fld id="{DFA8C626-DCFC-44B9-B53F-E89648D7BB7E}" type="datetimeFigureOut">
               <a:rPr lang="en-US" smtClean="0"/>
-              <a:t>3/17/2020</a:t>
+              <a:t>3/18/2020</a:t>
             </a:fld>
             <a:endParaRPr lang="en-US"/>
           </a:p>
@@ -11320,7 +11679,7 @@
           <a:p>
             <a:fld id="{DFA8C626-DCFC-44B9-B53F-E89648D7BB7E}" type="datetimeFigureOut">
               <a:rPr lang="en-US" smtClean="0"/>
-              <a:t>3/17/2020</a:t>
+              <a:t>3/18/2020</a:t>
             </a:fld>
             <a:endParaRPr lang="en-US"/>
           </a:p>
@@ -11561,7 +11920,7 @@
           <a:p>
             <a:fld id="{DFA8C626-DCFC-44B9-B53F-E89648D7BB7E}" type="datetimeFigureOut">
               <a:rPr lang="en-US" smtClean="0"/>
-              <a:t>3/17/2020</a:t>
+              <a:t>3/18/2020</a:t>
             </a:fld>
             <a:endParaRPr lang="en-US"/>
           </a:p>
@@ -13015,13 +13374,13 @@
   <p:clrMapOvr>
     <a:masterClrMapping/>
   </p:clrMapOvr>
-  <mc:AlternateContent xmlns:mc="http://schemas.openxmlformats.org/markup-compatibility/2006">
-    <mc:Choice xmlns:p14="http://schemas.microsoft.com/office/powerpoint/2010/main" Requires="p14">
+  <mc:AlternateContent xmlns:mc="http://schemas.openxmlformats.org/markup-compatibility/2006" xmlns:p14="http://schemas.microsoft.com/office/powerpoint/2010/main">
+    <mc:Choice Requires="p14">
       <p:transition spd="med" p14:dur="700">
         <p:fade/>
       </p:transition>
     </mc:Choice>
-    <mc:Fallback>
+    <mc:Fallback xmlns="">
       <p:transition spd="med">
         <p:fade/>
       </p:transition>
@@ -13232,13 +13591,13 @@
   <p:clrMapOvr>
     <a:masterClrMapping/>
   </p:clrMapOvr>
-  <mc:AlternateContent xmlns:mc="http://schemas.openxmlformats.org/markup-compatibility/2006">
-    <mc:Choice xmlns:p14="http://schemas.microsoft.com/office/powerpoint/2010/main" Requires="p14">
+  <mc:AlternateContent xmlns:mc="http://schemas.openxmlformats.org/markup-compatibility/2006" xmlns:p14="http://schemas.microsoft.com/office/powerpoint/2010/main">
+    <mc:Choice Requires="p14">
       <p:transition spd="med" p14:dur="700">
         <p:fade/>
       </p:transition>
     </mc:Choice>
-    <mc:Fallback>
+    <mc:Fallback xmlns="">
       <p:transition spd="med">
         <p:fade/>
       </p:transition>
@@ -13494,13 +13853,13 @@
   <p:clrMapOvr>
     <a:masterClrMapping/>
   </p:clrMapOvr>
-  <mc:AlternateContent xmlns:mc="http://schemas.openxmlformats.org/markup-compatibility/2006">
-    <mc:Choice xmlns:p14="http://schemas.microsoft.com/office/powerpoint/2010/main" Requires="p14">
+  <mc:AlternateContent xmlns:mc="http://schemas.openxmlformats.org/markup-compatibility/2006" xmlns:p14="http://schemas.microsoft.com/office/powerpoint/2010/main">
+    <mc:Choice Requires="p14">
       <p:transition spd="med" p14:dur="700">
         <p:fade/>
       </p:transition>
     </mc:Choice>
-    <mc:Fallback>
+    <mc:Fallback xmlns="">
       <p:transition spd="med">
         <p:fade/>
       </p:transition>
@@ -13918,13 +14277,13 @@
   <p:clrMapOvr>
     <a:masterClrMapping/>
   </p:clrMapOvr>
-  <mc:AlternateContent xmlns:mc="http://schemas.openxmlformats.org/markup-compatibility/2006">
-    <mc:Choice xmlns:p14="http://schemas.microsoft.com/office/powerpoint/2010/main" Requires="p14">
+  <mc:AlternateContent xmlns:mc="http://schemas.openxmlformats.org/markup-compatibility/2006" xmlns:p14="http://schemas.microsoft.com/office/powerpoint/2010/main">
+    <mc:Choice Requires="p14">
       <p:transition spd="med" p14:dur="700">
         <p:fade/>
       </p:transition>
     </mc:Choice>
-    <mc:Fallback>
+    <mc:Fallback xmlns="">
       <p:transition spd="med">
         <p:fade/>
       </p:transition>
@@ -14125,6 +14484,231 @@
   <p:clrMapOvr>
     <a:masterClrMapping/>
   </p:clrMapOvr>
+  <mc:AlternateContent xmlns:mc="http://schemas.openxmlformats.org/markup-compatibility/2006" xmlns:p14="http://schemas.microsoft.com/office/powerpoint/2010/main">
+    <mc:Choice Requires="p14">
+      <p:transition spd="med" p14:dur="700">
+        <p:fade/>
+      </p:transition>
+    </mc:Choice>
+    <mc:Fallback xmlns="">
+      <p:transition spd="med">
+        <p:fade/>
+      </p:transition>
+    </mc:Fallback>
+  </mc:AlternateContent>
+</p:sld>
+</file>
+
+<file path=ppt/slides/slide15.xml><?xml version="1.0" encoding="utf-8"?>
+<p:sld xmlns:a="http://schemas.openxmlformats.org/drawingml/2006/main" xmlns:r="http://schemas.openxmlformats.org/officeDocument/2006/relationships" xmlns:p="http://schemas.openxmlformats.org/presentationml/2006/main">
+  <p:cSld>
+    <p:spTree>
+      <p:nvGrpSpPr>
+        <p:cNvPr id="1" name=""/>
+        <p:cNvGrpSpPr/>
+        <p:nvPr/>
+      </p:nvGrpSpPr>
+      <p:grpSpPr>
+        <a:xfrm>
+          <a:off x="0" y="0"/>
+          <a:ext cx="0" cy="0"/>
+          <a:chOff x="0" y="0"/>
+          <a:chExt cx="0" cy="0"/>
+        </a:xfrm>
+      </p:grpSpPr>
+      <p:sp>
+        <p:nvSpPr>
+          <p:cNvPr id="2" name="Title 1"/>
+          <p:cNvSpPr>
+            <a:spLocks noGrp="1"/>
+          </p:cNvSpPr>
+          <p:nvPr>
+            <p:ph type="title"/>
+          </p:nvPr>
+        </p:nvSpPr>
+        <p:spPr>
+          <a:xfrm>
+            <a:off x="116839" y="141072"/>
+            <a:ext cx="11653523" cy="1158793"/>
+          </a:xfrm>
+        </p:spPr>
+        <p:txBody>
+          <a:bodyPr/>
+          <a:lstStyle/>
+          <a:p>
+            <a:r>
+              <a:rPr lang="en-US" dirty="0"/>
+              <a:t>Python – set()</a:t>
+            </a:r>
+          </a:p>
+        </p:txBody>
+      </p:sp>
+      <p:sp>
+        <p:nvSpPr>
+          <p:cNvPr id="6" name="TextBox 5">
+            <a:extLst>
+              <a:ext uri="{FF2B5EF4-FFF2-40B4-BE49-F238E27FC236}">
+                <a16:creationId xmlns:a16="http://schemas.microsoft.com/office/drawing/2014/main" id="{7868BA2F-18C9-4CD3-96D8-0FA2E4B1F92B}"/>
+              </a:ext>
+            </a:extLst>
+          </p:cNvPr>
+          <p:cNvSpPr txBox="1"/>
+          <p:nvPr/>
+        </p:nvSpPr>
+        <p:spPr>
+          <a:xfrm>
+            <a:off x="540912" y="1191901"/>
+            <a:ext cx="10550556" cy="1815882"/>
+          </a:xfrm>
+          <a:prstGeom prst="rect">
+            <a:avLst/>
+          </a:prstGeom>
+          <a:noFill/>
+        </p:spPr>
+        <p:txBody>
+          <a:bodyPr wrap="square" rtlCol="0">
+            <a:spAutoFit/>
+          </a:bodyPr>
+          <a:lstStyle/>
+          <a:p>
+            <a:pPr>
+              <a:defRPr/>
+            </a:pPr>
+            <a:r>
+              <a:rPr lang="en-US" sz="2800" dirty="0"/>
+              <a:t>The final step we need to determine a winner in Tic Tac Toe is to determine if a winner exists in a row, column, or diagonal. </a:t>
+            </a:r>
+          </a:p>
+          <a:p>
+            <a:pPr>
+              <a:defRPr/>
+            </a:pPr>
+            <a:endParaRPr lang="en-US" sz="2800" dirty="0">
+              <a:solidFill>
+                <a:prstClr val="white"/>
+              </a:solidFill>
+            </a:endParaRPr>
+          </a:p>
+          <a:p>
+            <a:pPr>
+              <a:defRPr/>
+            </a:pPr>
+            <a:r>
+              <a:rPr lang="en-US" sz="2800" dirty="0">
+                <a:solidFill>
+                  <a:prstClr val="white"/>
+                </a:solidFill>
+              </a:rPr>
+              <a:t>Python set() function can tell us how many unique items are in a list.</a:t>
+            </a:r>
+          </a:p>
+        </p:txBody>
+      </p:sp>
+      <p:pic>
+        <p:nvPicPr>
+          <p:cNvPr id="8" name="Picture 7">
+            <a:extLst>
+              <a:ext uri="{FF2B5EF4-FFF2-40B4-BE49-F238E27FC236}">
+                <a16:creationId xmlns:a16="http://schemas.microsoft.com/office/drawing/2014/main" id="{DC178C8E-0F82-4CE3-98DA-CA6E67F26387}"/>
+              </a:ext>
+            </a:extLst>
+          </p:cNvPr>
+          <p:cNvPicPr>
+            <a:picLocks noChangeAspect="1"/>
+          </p:cNvPicPr>
+          <p:nvPr/>
+        </p:nvPicPr>
+        <p:blipFill>
+          <a:blip r:embed="rId3"/>
+          <a:stretch>
+            <a:fillRect/>
+          </a:stretch>
+        </p:blipFill>
+        <p:spPr>
+          <a:xfrm>
+            <a:off x="6184006" y="3160223"/>
+            <a:ext cx="4542357" cy="3028238"/>
+          </a:xfrm>
+          <a:prstGeom prst="rect">
+            <a:avLst/>
+          </a:prstGeom>
+        </p:spPr>
+      </p:pic>
+      <p:sp>
+        <p:nvSpPr>
+          <p:cNvPr id="10" name="TextBox 9">
+            <a:extLst>
+              <a:ext uri="{FF2B5EF4-FFF2-40B4-BE49-F238E27FC236}">
+                <a16:creationId xmlns:a16="http://schemas.microsoft.com/office/drawing/2014/main" id="{D5E81688-5240-4FA3-9C9D-109430DA77A9}"/>
+              </a:ext>
+            </a:extLst>
+          </p:cNvPr>
+          <p:cNvSpPr txBox="1"/>
+          <p:nvPr/>
+        </p:nvSpPr>
+        <p:spPr>
+          <a:xfrm>
+            <a:off x="540912" y="3160223"/>
+            <a:ext cx="5643094" cy="2677656"/>
+          </a:xfrm>
+          <a:prstGeom prst="rect">
+            <a:avLst/>
+          </a:prstGeom>
+          <a:noFill/>
+        </p:spPr>
+        <p:txBody>
+          <a:bodyPr wrap="square" rtlCol="0">
+            <a:spAutoFit/>
+          </a:bodyPr>
+          <a:lstStyle/>
+          <a:p>
+            <a:pPr>
+              <a:defRPr/>
+            </a:pPr>
+            <a:r>
+              <a:rPr lang="en-US" sz="2800" dirty="0">
+                <a:solidFill>
+                  <a:prstClr val="white"/>
+                </a:solidFill>
+              </a:rPr>
+              <a:t>Using set, you can test each row, column or diagonal to determine if there is only one item in the set.</a:t>
+            </a:r>
+          </a:p>
+          <a:p>
+            <a:pPr>
+              <a:defRPr/>
+            </a:pPr>
+            <a:endParaRPr lang="en-US" sz="2800" dirty="0">
+              <a:solidFill>
+                <a:prstClr val="white"/>
+              </a:solidFill>
+            </a:endParaRPr>
+          </a:p>
+          <a:p>
+            <a:pPr>
+              <a:defRPr/>
+            </a:pPr>
+            <a:r>
+              <a:rPr lang="en-US" sz="2800" dirty="0">
+                <a:solidFill>
+                  <a:prstClr val="white"/>
+                </a:solidFill>
+              </a:rPr>
+              <a:t>If there is, pop() the set to figure out who the winner is.</a:t>
+            </a:r>
+          </a:p>
+        </p:txBody>
+      </p:sp>
+    </p:spTree>
+    <p:extLst>
+      <p:ext uri="{BB962C8B-B14F-4D97-AF65-F5344CB8AC3E}">
+        <p14:creationId xmlns:p14="http://schemas.microsoft.com/office/powerpoint/2010/main" val="3233444862"/>
+      </p:ext>
+    </p:extLst>
+  </p:cSld>
+  <p:clrMapOvr>
+    <a:masterClrMapping/>
+  </p:clrMapOvr>
   <mc:AlternateContent xmlns:mc="http://schemas.openxmlformats.org/markup-compatibility/2006">
     <mc:Choice xmlns:p14="http://schemas.microsoft.com/office/powerpoint/2010/main" Requires="p14">
       <p:transition spd="med" p14:dur="700">
@@ -14140,7 +14724,7 @@
 </p:sld>
 </file>
 
-<file path=ppt/slides/slide15.xml><?xml version="1.0" encoding="utf-8"?>
+<file path=ppt/slides/slide16.xml><?xml version="1.0" encoding="utf-8"?>
 <p:sld xmlns:a="http://schemas.openxmlformats.org/drawingml/2006/main" xmlns:r="http://schemas.openxmlformats.org/officeDocument/2006/relationships" xmlns:p="http://schemas.openxmlformats.org/presentationml/2006/main">
   <p:cSld>
     <p:spTree>
@@ -15927,13 +16511,13 @@
   <p:clrMapOvr>
     <a:masterClrMapping/>
   </p:clrMapOvr>
-  <mc:AlternateContent xmlns:mc="http://schemas.openxmlformats.org/markup-compatibility/2006">
-    <mc:Choice xmlns:p14="http://schemas.microsoft.com/office/powerpoint/2010/main" Requires="p14">
+  <mc:AlternateContent xmlns:mc="http://schemas.openxmlformats.org/markup-compatibility/2006" xmlns:p14="http://schemas.microsoft.com/office/powerpoint/2010/main">
+    <mc:Choice Requires="p14">
       <p:transition spd="med" p14:dur="700">
         <p:fade/>
       </p:transition>
     </mc:Choice>
-    <mc:Fallback>
+    <mc:Fallback xmlns="">
       <p:transition spd="med">
         <p:fade/>
       </p:transition>
@@ -16187,13 +16771,13 @@
   <p:clrMapOvr>
     <a:masterClrMapping/>
   </p:clrMapOvr>
-  <mc:AlternateContent xmlns:mc="http://schemas.openxmlformats.org/markup-compatibility/2006">
-    <mc:Choice xmlns:p14="http://schemas.microsoft.com/office/powerpoint/2010/main" Requires="p14">
+  <mc:AlternateContent xmlns:mc="http://schemas.openxmlformats.org/markup-compatibility/2006" xmlns:p14="http://schemas.microsoft.com/office/powerpoint/2010/main">
+    <mc:Choice Requires="p14">
       <p:transition spd="med" p14:dur="700">
         <p:fade/>
       </p:transition>
     </mc:Choice>
-    <mc:Fallback>
+    <mc:Fallback xmlns="">
       <p:transition spd="med">
         <p:fade/>
       </p:transition>

</xml_diff>